<commit_message>
Smallish changes to the proposal; mostly in figures.
</commit_message>
<xml_diff>
--- a/sbml-level-3/version-1/comp/HierarchicalSBase.pptx
+++ b/sbml-level-3/version-1/comp/HierarchicalSBase.pptx
@@ -192,7 +192,7 @@
           <a:p>
             <a:fld id="{7754A941-C6C2-4027-B1F4-A5E937B2245F}" type="datetimeFigureOut">
               <a:rPr lang="en-US" smtClean="0"/>
-              <a:t>10/28/2010</a:t>
+              <a:t>3/8/2011</a:t>
             </a:fld>
             <a:endParaRPr lang="en-US"/>
           </a:p>
@@ -730,7 +730,7 @@
           <a:p>
             <a:fld id="{F0172217-DC24-48CD-AE89-68C8C8D878B4}" type="datetimeFigureOut">
               <a:rPr lang="en-US" smtClean="0"/>
-              <a:t>10/28/2010</a:t>
+              <a:t>3/8/2011</a:t>
             </a:fld>
             <a:endParaRPr lang="en-US"/>
           </a:p>
@@ -900,7 +900,7 @@
           <a:p>
             <a:fld id="{F0172217-DC24-48CD-AE89-68C8C8D878B4}" type="datetimeFigureOut">
               <a:rPr lang="en-US" smtClean="0"/>
-              <a:t>10/28/2010</a:t>
+              <a:t>3/8/2011</a:t>
             </a:fld>
             <a:endParaRPr lang="en-US"/>
           </a:p>
@@ -1080,7 +1080,7 @@
           <a:p>
             <a:fld id="{F0172217-DC24-48CD-AE89-68C8C8D878B4}" type="datetimeFigureOut">
               <a:rPr lang="en-US" smtClean="0"/>
-              <a:t>10/28/2010</a:t>
+              <a:t>3/8/2011</a:t>
             </a:fld>
             <a:endParaRPr lang="en-US"/>
           </a:p>
@@ -1250,7 +1250,7 @@
           <a:p>
             <a:fld id="{F0172217-DC24-48CD-AE89-68C8C8D878B4}" type="datetimeFigureOut">
               <a:rPr lang="en-US" smtClean="0"/>
-              <a:t>10/28/2010</a:t>
+              <a:t>3/8/2011</a:t>
             </a:fld>
             <a:endParaRPr lang="en-US"/>
           </a:p>
@@ -1496,7 +1496,7 @@
           <a:p>
             <a:fld id="{F0172217-DC24-48CD-AE89-68C8C8D878B4}" type="datetimeFigureOut">
               <a:rPr lang="en-US" smtClean="0"/>
-              <a:t>10/28/2010</a:t>
+              <a:t>3/8/2011</a:t>
             </a:fld>
             <a:endParaRPr lang="en-US"/>
           </a:p>
@@ -1784,7 +1784,7 @@
           <a:p>
             <a:fld id="{F0172217-DC24-48CD-AE89-68C8C8D878B4}" type="datetimeFigureOut">
               <a:rPr lang="en-US" smtClean="0"/>
-              <a:t>10/28/2010</a:t>
+              <a:t>3/8/2011</a:t>
             </a:fld>
             <a:endParaRPr lang="en-US"/>
           </a:p>
@@ -2206,7 +2206,7 @@
           <a:p>
             <a:fld id="{F0172217-DC24-48CD-AE89-68C8C8D878B4}" type="datetimeFigureOut">
               <a:rPr lang="en-US" smtClean="0"/>
-              <a:t>10/28/2010</a:t>
+              <a:t>3/8/2011</a:t>
             </a:fld>
             <a:endParaRPr lang="en-US"/>
           </a:p>
@@ -2324,7 +2324,7 @@
           <a:p>
             <a:fld id="{F0172217-DC24-48CD-AE89-68C8C8D878B4}" type="datetimeFigureOut">
               <a:rPr lang="en-US" smtClean="0"/>
-              <a:t>10/28/2010</a:t>
+              <a:t>3/8/2011</a:t>
             </a:fld>
             <a:endParaRPr lang="en-US"/>
           </a:p>
@@ -2419,7 +2419,7 @@
           <a:p>
             <a:fld id="{F0172217-DC24-48CD-AE89-68C8C8D878B4}" type="datetimeFigureOut">
               <a:rPr lang="en-US" smtClean="0"/>
-              <a:t>10/28/2010</a:t>
+              <a:t>3/8/2011</a:t>
             </a:fld>
             <a:endParaRPr lang="en-US"/>
           </a:p>
@@ -2696,7 +2696,7 @@
           <a:p>
             <a:fld id="{F0172217-DC24-48CD-AE89-68C8C8D878B4}" type="datetimeFigureOut">
               <a:rPr lang="en-US" smtClean="0"/>
-              <a:t>10/28/2010</a:t>
+              <a:t>3/8/2011</a:t>
             </a:fld>
             <a:endParaRPr lang="en-US"/>
           </a:p>
@@ -2949,7 +2949,7 @@
           <a:p>
             <a:fld id="{F0172217-DC24-48CD-AE89-68C8C8D878B4}" type="datetimeFigureOut">
               <a:rPr lang="en-US" smtClean="0"/>
-              <a:t>10/28/2010</a:t>
+              <a:t>3/8/2011</a:t>
             </a:fld>
             <a:endParaRPr lang="en-US"/>
           </a:p>
@@ -3162,7 +3162,7 @@
           <a:p>
             <a:fld id="{F0172217-DC24-48CD-AE89-68C8C8D878B4}" type="datetimeFigureOut">
               <a:rPr lang="en-US" smtClean="0"/>
-              <a:t>10/28/2010</a:t>
+              <a:t>3/8/2011</a:t>
             </a:fld>
             <a:endParaRPr lang="en-US"/>
           </a:p>
@@ -3602,8 +3602,8 @@
           </p:nvCxnSpPr>
           <p:spPr>
             <a:xfrm rot="16200000" flipH="1">
-              <a:off x="406782" y="332217"/>
-              <a:ext cx="236491" cy="822289"/>
+              <a:off x="455351" y="283648"/>
+              <a:ext cx="236491" cy="919427"/>
             </a:xfrm>
             <a:prstGeom prst="bentConnector3">
               <a:avLst>
@@ -3640,7 +3640,7 @@
           <p:spPr>
             <a:xfrm>
               <a:off x="70179" y="549155"/>
-              <a:ext cx="575799" cy="369332"/>
+              <a:ext cx="1300356" cy="369332"/>
             </a:xfrm>
             <a:prstGeom prst="rect">
               <a:avLst/>
@@ -3653,12 +3653,12 @@
             <a:lstStyle/>
             <a:p>
               <a:r>
-                <a:rPr lang="en-US" sz="900" dirty="0" smtClean="0">
+                <a:rPr lang="en-US" sz="900" dirty="0" err="1" smtClean="0">
                   <a:solidFill>
                     <a:srgbClr val="00B050"/>
                   </a:solidFill>
                 </a:rPr>
-                <a:t>replaces</a:t>
+                <a:t>listOfReplacedElements</a:t>
               </a:r>
               <a:endParaRPr lang="en-US" sz="900" dirty="0">
                 <a:solidFill>
@@ -3687,7 +3687,7 @@
           <p:spPr>
             <a:xfrm>
               <a:off x="154314" y="1263364"/>
-              <a:ext cx="744114" cy="369332"/>
+              <a:ext cx="982961" cy="369332"/>
             </a:xfrm>
             <a:prstGeom prst="rect">
               <a:avLst/>
@@ -3705,7 +3705,23 @@
                     <a:srgbClr val="0070C0"/>
                   </a:solidFill>
                 </a:rPr>
-                <a:t>subelement</a:t>
+                <a:t>replaced</a:t>
+              </a:r>
+              <a:r>
+                <a:rPr lang="en-US" sz="900" dirty="0" err="1">
+                  <a:solidFill>
+                    <a:srgbClr val="0070C0"/>
+                  </a:solidFill>
+                </a:rPr>
+                <a:t>E</a:t>
+              </a:r>
+              <a:r>
+                <a:rPr lang="en-US" sz="900" dirty="0" err="1" smtClean="0">
+                  <a:solidFill>
+                    <a:srgbClr val="0070C0"/>
+                  </a:solidFill>
+                </a:rPr>
+                <a:t>lement</a:t>
               </a:r>
               <a:endParaRPr lang="en-US" sz="900" dirty="0">
                 <a:solidFill>
@@ -3774,9 +3790,9 @@
           <p:grpSpPr>
             <a:xfrm>
               <a:off x="175012" y="861608"/>
-              <a:ext cx="1489673" cy="457199"/>
+              <a:ext cx="1683950" cy="457199"/>
               <a:chOff x="162625" y="2704579"/>
-              <a:chExt cx="1489673" cy="457199"/>
+              <a:chExt cx="1683950" cy="457199"/>
             </a:xfrm>
           </p:grpSpPr>
           <p:sp>
@@ -3787,8 +3803,8 @@
             </p:nvSpPr>
             <p:spPr>
               <a:xfrm>
-                <a:off x="195272" y="2704579"/>
-                <a:ext cx="1457026" cy="304800"/>
+                <a:off x="195271" y="2704579"/>
+                <a:ext cx="1651304" cy="304800"/>
               </a:xfrm>
               <a:prstGeom prst="rect">
                 <a:avLst/>
@@ -3827,7 +3843,7 @@
                       <a:srgbClr val="0070C0"/>
                     </a:solidFill>
                   </a:rPr>
-                  <a:t>ListOfReplacements</a:t>
+                  <a:t>ListOfReplacedElements</a:t>
                 </a:r>
                 <a:endParaRPr lang="en-US" sz="1100" b="1" dirty="0">
                   <a:solidFill>
@@ -4360,15 +4376,7 @@
                       <a:srgbClr val="0070C0"/>
                     </a:solidFill>
                   </a:rPr>
-                  <a:t>identical</a:t>
-                </a:r>
-                <a:r>
-                  <a:rPr lang="en-US" sz="900" dirty="0" smtClean="0">
-                    <a:solidFill>
-                      <a:srgbClr val="0070C0"/>
-                    </a:solidFill>
-                  </a:rPr>
-                  <a:t>: </a:t>
+                  <a:t>identical: </a:t>
                 </a:r>
                 <a:r>
                   <a:rPr lang="en-US" sz="900" dirty="0" err="1" smtClean="0">
@@ -4508,8 +4516,8 @@
           </p:nvCxnSpPr>
           <p:spPr>
             <a:xfrm flipV="1">
-              <a:off x="1664685" y="571501"/>
-              <a:ext cx="898468" cy="442507"/>
+              <a:off x="1858962" y="571501"/>
+              <a:ext cx="704191" cy="442507"/>
             </a:xfrm>
             <a:prstGeom prst="bentConnector2">
               <a:avLst/>

</xml_diff>